<commit_message>
> Updated the PowerPoint slides > Added a new page - Pet Search page
</commit_message>
<xml_diff>
--- a/Rancor_Presenation_4.pptx
+++ b/Rancor_Presenation_4.pptx
@@ -5,21 +5,24 @@
     <p:sldMasterId id="2147483745" r:id="rId1"/>
   </p:sldMasterIdLst>
   <p:notesMasterIdLst>
-    <p:notesMasterId r:id="rId11"/>
+    <p:notesMasterId r:id="rId14"/>
   </p:notesMasterIdLst>
   <p:handoutMasterIdLst>
-    <p:handoutMasterId r:id="rId12"/>
+    <p:handoutMasterId r:id="rId15"/>
   </p:handoutMasterIdLst>
   <p:sldIdLst>
     <p:sldId id="256" r:id="rId2"/>
     <p:sldId id="265" r:id="rId3"/>
-    <p:sldId id="277" r:id="rId4"/>
-    <p:sldId id="271" r:id="rId5"/>
-    <p:sldId id="278" r:id="rId6"/>
-    <p:sldId id="272" r:id="rId7"/>
-    <p:sldId id="273" r:id="rId8"/>
-    <p:sldId id="274" r:id="rId9"/>
-    <p:sldId id="275" r:id="rId10"/>
+    <p:sldId id="272" r:id="rId4"/>
+    <p:sldId id="279" r:id="rId5"/>
+    <p:sldId id="277" r:id="rId6"/>
+    <p:sldId id="280" r:id="rId7"/>
+    <p:sldId id="271" r:id="rId8"/>
+    <p:sldId id="278" r:id="rId9"/>
+    <p:sldId id="281" r:id="rId10"/>
+    <p:sldId id="274" r:id="rId11"/>
+    <p:sldId id="273" r:id="rId12"/>
+    <p:sldId id="275" r:id="rId13"/>
   </p:sldIdLst>
   <p:sldSz cx="12192000" cy="6858000"/>
   <p:notesSz cx="6858000" cy="9144000"/>
@@ -659,6 +662,90 @@
     </a:lvl9pPr>
   </p:notesStyle>
 </p:notesMaster>
+</file>
+
+<file path=ppt/notesSlides/notesSlide1.xml><?xml version="1.0" encoding="utf-8"?>
+<p:notes xmlns:a="http://schemas.openxmlformats.org/drawingml/2006/main" xmlns:r="http://schemas.openxmlformats.org/officeDocument/2006/relationships" xmlns:p="http://schemas.openxmlformats.org/presentationml/2006/main">
+  <p:cSld>
+    <p:spTree>
+      <p:nvGrpSpPr>
+        <p:cNvPr id="1" name=""/>
+        <p:cNvGrpSpPr/>
+        <p:nvPr/>
+      </p:nvGrpSpPr>
+      <p:grpSpPr>
+        <a:xfrm>
+          <a:off x="0" y="0"/>
+          <a:ext cx="0" cy="0"/>
+          <a:chOff x="0" y="0"/>
+          <a:chExt cx="0" cy="0"/>
+        </a:xfrm>
+      </p:grpSpPr>
+      <p:sp>
+        <p:nvSpPr>
+          <p:cNvPr id="2" name="Slide Image Placeholder 1"/>
+          <p:cNvSpPr>
+            <a:spLocks noGrp="1" noRot="1" noChangeAspect="1"/>
+          </p:cNvSpPr>
+          <p:nvPr>
+            <p:ph type="sldImg"/>
+          </p:nvPr>
+        </p:nvSpPr>
+        <p:spPr/>
+      </p:sp>
+      <p:sp>
+        <p:nvSpPr>
+          <p:cNvPr id="3" name="Notes Placeholder 2"/>
+          <p:cNvSpPr>
+            <a:spLocks noGrp="1"/>
+          </p:cNvSpPr>
+          <p:nvPr>
+            <p:ph type="body" idx="1"/>
+          </p:nvPr>
+        </p:nvSpPr>
+        <p:spPr/>
+        <p:txBody>
+          <a:bodyPr/>
+          <a:lstStyle/>
+          <a:p>
+            <a:endParaRPr lang="en-US" dirty="0"/>
+          </a:p>
+        </p:txBody>
+      </p:sp>
+      <p:sp>
+        <p:nvSpPr>
+          <p:cNvPr id="4" name="Slide Number Placeholder 3"/>
+          <p:cNvSpPr>
+            <a:spLocks noGrp="1"/>
+          </p:cNvSpPr>
+          <p:nvPr>
+            <p:ph type="sldNum" sz="quarter" idx="5"/>
+          </p:nvPr>
+        </p:nvSpPr>
+        <p:spPr/>
+        <p:txBody>
+          <a:bodyPr/>
+          <a:lstStyle/>
+          <a:p>
+            <a:fld id="{5EE2CF44-2B13-41B4-A334-1CDF534EEBBF}" type="slidenum">
+              <a:rPr lang="en-US" smtClean="0"/>
+              <a:t>5</a:t>
+            </a:fld>
+            <a:endParaRPr lang="en-US"/>
+          </a:p>
+        </p:txBody>
+      </p:sp>
+    </p:spTree>
+    <p:extLst>
+      <p:ext uri="{BB962C8B-B14F-4D97-AF65-F5344CB8AC3E}">
+        <p14:creationId xmlns:p14="http://schemas.microsoft.com/office/powerpoint/2010/main" val="3123982423"/>
+      </p:ext>
+    </p:extLst>
+  </p:cSld>
+  <p:clrMapOvr>
+    <a:masterClrMapping/>
+  </p:clrMapOvr>
+</p:notes>
 </file>
 
 <file path=ppt/slideLayouts/slideLayout1.xml><?xml version="1.0" encoding="utf-8"?>
@@ -7010,6 +7097,439 @@
 </p:sld>
 </file>
 
+<file path=ppt/slides/slide10.xml><?xml version="1.0" encoding="utf-8"?>
+<p:sld xmlns:a="http://schemas.openxmlformats.org/drawingml/2006/main" xmlns:r="http://schemas.openxmlformats.org/officeDocument/2006/relationships" xmlns:p="http://schemas.openxmlformats.org/presentationml/2006/main">
+  <p:cSld>
+    <p:spTree>
+      <p:nvGrpSpPr>
+        <p:cNvPr id="1" name=""/>
+        <p:cNvGrpSpPr/>
+        <p:nvPr/>
+      </p:nvGrpSpPr>
+      <p:grpSpPr>
+        <a:xfrm>
+          <a:off x="0" y="0"/>
+          <a:ext cx="0" cy="0"/>
+          <a:chOff x="0" y="0"/>
+          <a:chExt cx="0" cy="0"/>
+        </a:xfrm>
+      </p:grpSpPr>
+      <p:sp>
+        <p:nvSpPr>
+          <p:cNvPr id="3" name="Content Placeholder 2">
+            <a:extLst>
+              <a:ext uri="{FF2B5EF4-FFF2-40B4-BE49-F238E27FC236}">
+                <a16:creationId xmlns:a16="http://schemas.microsoft.com/office/drawing/2014/main" id="{E81F4E3A-FABB-488F-A612-325C171455D9}"/>
+              </a:ext>
+            </a:extLst>
+          </p:cNvPr>
+          <p:cNvSpPr>
+            <a:spLocks noGrp="1"/>
+          </p:cNvSpPr>
+          <p:nvPr>
+            <p:ph idx="1"/>
+          </p:nvPr>
+        </p:nvSpPr>
+        <p:spPr>
+          <a:xfrm>
+            <a:off x="677334" y="546755"/>
+            <a:ext cx="8596668" cy="5835191"/>
+          </a:xfrm>
+        </p:spPr>
+        <p:txBody>
+          <a:bodyPr/>
+          <a:lstStyle/>
+          <a:p>
+            <a:r>
+              <a:rPr lang="en-US" dirty="0"/>
+              <a:t>One page still missing:</a:t>
+            </a:r>
+          </a:p>
+          <a:p>
+            <a:pPr lvl="1">
+              <a:buFont typeface="Wingdings" panose="05000000000000000000" pitchFamily="2" charset="2"/>
+              <a:buChar char="v"/>
+            </a:pPr>
+            <a:r>
+              <a:rPr lang="en-US" sz="2400" b="1" dirty="0"/>
+              <a:t>admin.html</a:t>
+            </a:r>
+          </a:p>
+          <a:p>
+            <a:pPr lvl="2">
+              <a:buFont typeface="Wingdings" panose="05000000000000000000" pitchFamily="2" charset="2"/>
+              <a:buChar char="§"/>
+            </a:pPr>
+            <a:r>
+              <a:rPr lang="en-US" sz="1800" dirty="0"/>
+              <a:t>Only exclusive to users w/ admin privileges (authenticated via login)</a:t>
+            </a:r>
+          </a:p>
+          <a:p>
+            <a:pPr lvl="2">
+              <a:buFont typeface="Wingdings" panose="05000000000000000000" pitchFamily="2" charset="2"/>
+              <a:buChar char="§"/>
+            </a:pPr>
+            <a:r>
+              <a:rPr lang="en-US" sz="1800" dirty="0"/>
+              <a:t>Allows them to add/remove/edit pets directly from the database via the webpage</a:t>
+            </a:r>
+          </a:p>
+          <a:p>
+            <a:pPr marL="914400" lvl="2" indent="0">
+              <a:buNone/>
+            </a:pPr>
+            <a:endParaRPr lang="en-US" sz="1800" dirty="0"/>
+          </a:p>
+          <a:p>
+            <a:r>
+              <a:rPr lang="en-US" dirty="0"/>
+              <a:t>Revamp other pages to match theme</a:t>
+            </a:r>
+          </a:p>
+          <a:p>
+            <a:endParaRPr lang="en-US" dirty="0"/>
+          </a:p>
+          <a:p>
+            <a:r>
+              <a:rPr lang="en-US" dirty="0"/>
+              <a:t>Add missing functionalities to GUIs</a:t>
+            </a:r>
+          </a:p>
+          <a:p>
+            <a:endParaRPr lang="en-US" dirty="0"/>
+          </a:p>
+          <a:p>
+            <a:r>
+              <a:rPr lang="en-US" dirty="0"/>
+              <a:t>Decide the best fit for presenters!</a:t>
+            </a:r>
+          </a:p>
+          <a:p>
+            <a:endParaRPr lang="en-US" dirty="0"/>
+          </a:p>
+          <a:p>
+            <a:r>
+              <a:rPr lang="en-US" dirty="0"/>
+              <a:t>SUIT UP &amp; PRESENT!</a:t>
+            </a:r>
+          </a:p>
+          <a:p>
+            <a:endParaRPr lang="en-US" dirty="0"/>
+          </a:p>
+          <a:p>
+            <a:pPr>
+              <a:buFont typeface="Wingdings" panose="05000000000000000000" pitchFamily="2" charset="2"/>
+              <a:buChar char="§"/>
+            </a:pPr>
+            <a:endParaRPr lang="en-US" sz="2200" dirty="0"/>
+          </a:p>
+          <a:p>
+            <a:pPr lvl="2">
+              <a:buFont typeface="Wingdings" panose="05000000000000000000" pitchFamily="2" charset="2"/>
+              <a:buChar char="§"/>
+            </a:pPr>
+            <a:endParaRPr lang="en-US" sz="1800" dirty="0"/>
+          </a:p>
+          <a:p>
+            <a:endParaRPr lang="en-US" dirty="0"/>
+          </a:p>
+        </p:txBody>
+      </p:sp>
+    </p:spTree>
+    <p:extLst>
+      <p:ext uri="{BB962C8B-B14F-4D97-AF65-F5344CB8AC3E}">
+        <p14:creationId xmlns:p14="http://schemas.microsoft.com/office/powerpoint/2010/main" val="2942119607"/>
+      </p:ext>
+    </p:extLst>
+  </p:cSld>
+  <p:clrMapOvr>
+    <a:masterClrMapping/>
+  </p:clrMapOvr>
+</p:sld>
+</file>
+
+<file path=ppt/slides/slide11.xml><?xml version="1.0" encoding="utf-8"?>
+<p:sld xmlns:a="http://schemas.openxmlformats.org/drawingml/2006/main" xmlns:r="http://schemas.openxmlformats.org/officeDocument/2006/relationships" xmlns:p="http://schemas.openxmlformats.org/presentationml/2006/main">
+  <p:cSld>
+    <p:spTree>
+      <p:nvGrpSpPr>
+        <p:cNvPr id="1" name=""/>
+        <p:cNvGrpSpPr/>
+        <p:nvPr/>
+      </p:nvGrpSpPr>
+      <p:grpSpPr>
+        <a:xfrm>
+          <a:off x="0" y="0"/>
+          <a:ext cx="0" cy="0"/>
+          <a:chOff x="0" y="0"/>
+          <a:chExt cx="0" cy="0"/>
+        </a:xfrm>
+      </p:grpSpPr>
+      <p:sp>
+        <p:nvSpPr>
+          <p:cNvPr id="2" name="Title 1">
+            <a:extLst>
+              <a:ext uri="{FF2B5EF4-FFF2-40B4-BE49-F238E27FC236}">
+                <a16:creationId xmlns:a16="http://schemas.microsoft.com/office/drawing/2014/main" id="{9E8CE07C-7C33-4080-BBF9-0DE5A31ECE31}"/>
+              </a:ext>
+            </a:extLst>
+          </p:cNvPr>
+          <p:cNvSpPr>
+            <a:spLocks noGrp="1"/>
+          </p:cNvSpPr>
+          <p:nvPr>
+            <p:ph type="title"/>
+          </p:nvPr>
+        </p:nvSpPr>
+        <p:spPr/>
+        <p:txBody>
+          <a:bodyPr/>
+          <a:lstStyle/>
+          <a:p>
+            <a:r>
+              <a:rPr lang="en-US"/>
+              <a:t>GitHub Repository</a:t>
+            </a:r>
+          </a:p>
+        </p:txBody>
+      </p:sp>
+      <p:sp>
+        <p:nvSpPr>
+          <p:cNvPr id="3" name="Content Placeholder 2">
+            <a:extLst>
+              <a:ext uri="{FF2B5EF4-FFF2-40B4-BE49-F238E27FC236}">
+                <a16:creationId xmlns:a16="http://schemas.microsoft.com/office/drawing/2014/main" id="{4D1D71C0-6725-492A-A79E-FB02E8C2E4E9}"/>
+              </a:ext>
+            </a:extLst>
+          </p:cNvPr>
+          <p:cNvSpPr>
+            <a:spLocks noGrp="1"/>
+          </p:cNvSpPr>
+          <p:nvPr>
+            <p:ph idx="1"/>
+          </p:nvPr>
+        </p:nvSpPr>
+        <p:spPr/>
+        <p:txBody>
+          <a:bodyPr/>
+          <a:lstStyle/>
+          <a:p>
+            <a:pPr marL="0" indent="0">
+              <a:spcBef>
+                <a:spcPts val="0"/>
+              </a:spcBef>
+              <a:spcAft>
+                <a:spcPts val="0"/>
+              </a:spcAft>
+              <a:buNone/>
+            </a:pPr>
+            <a:r>
+              <a:rPr lang="en-US"/>
+              <a:t>Rancor Group GitHub Link:</a:t>
+            </a:r>
+            <a:endParaRPr lang="en-US" sz="1600"/>
+          </a:p>
+          <a:p>
+            <a:pPr marL="0" indent="0">
+              <a:spcBef>
+                <a:spcPts val="0"/>
+              </a:spcBef>
+              <a:spcAft>
+                <a:spcPts val="0"/>
+              </a:spcAft>
+              <a:buNone/>
+            </a:pPr>
+            <a:endParaRPr lang="en-US" sz="2000" u="sng" kern="100">
+              <a:solidFill>
+                <a:srgbClr val="0563C1"/>
+              </a:solidFill>
+              <a:latin typeface="Calibri" panose="020F0502020204030204" pitchFamily="34" charset="0"/>
+              <a:ea typeface="Calibri" panose="020F0502020204030204" pitchFamily="34" charset="0"/>
+              <a:cs typeface="Times New Roman" panose="02020603050405020304" pitchFamily="18" charset="0"/>
+              <a:hlinkClick r:id="rId2"/>
+            </a:endParaRPr>
+          </a:p>
+          <a:p>
+            <a:pPr marL="0" indent="0">
+              <a:spcBef>
+                <a:spcPts val="0"/>
+              </a:spcBef>
+              <a:spcAft>
+                <a:spcPts val="0"/>
+              </a:spcAft>
+              <a:buNone/>
+            </a:pPr>
+            <a:r>
+              <a:rPr lang="en-US" sz="2000" u="sng" kern="100">
+                <a:solidFill>
+                  <a:srgbClr val="0563C1"/>
+                </a:solidFill>
+                <a:effectLst/>
+                <a:latin typeface="Calibri" panose="020F0502020204030204" pitchFamily="34" charset="0"/>
+                <a:ea typeface="Calibri" panose="020F0502020204030204" pitchFamily="34" charset="0"/>
+                <a:cs typeface="Times New Roman" panose="02020603050405020304" pitchFamily="18" charset="0"/>
+                <a:hlinkClick r:id="rId2"/>
+              </a:rPr>
+              <a:t>https://github.com/RobertDevaney/ParadisePetRescue</a:t>
+            </a:r>
+            <a:endParaRPr lang="en-US" sz="2000" kern="100">
+              <a:effectLst/>
+              <a:latin typeface="Calibri" panose="020F0502020204030204" pitchFamily="34" charset="0"/>
+              <a:ea typeface="Calibri" panose="020F0502020204030204" pitchFamily="34" charset="0"/>
+              <a:cs typeface="Times New Roman" panose="02020603050405020304" pitchFamily="18" charset="0"/>
+            </a:endParaRPr>
+          </a:p>
+          <a:p>
+            <a:endParaRPr lang="en-US"/>
+          </a:p>
+          <a:p>
+            <a:endParaRPr lang="en-US"/>
+          </a:p>
+        </p:txBody>
+      </p:sp>
+    </p:spTree>
+    <p:extLst>
+      <p:ext uri="{BB962C8B-B14F-4D97-AF65-F5344CB8AC3E}">
+        <p14:creationId xmlns:p14="http://schemas.microsoft.com/office/powerpoint/2010/main" val="3166160437"/>
+      </p:ext>
+    </p:extLst>
+  </p:cSld>
+  <p:clrMapOvr>
+    <a:masterClrMapping/>
+  </p:clrMapOvr>
+</p:sld>
+</file>
+
+<file path=ppt/slides/slide12.xml><?xml version="1.0" encoding="utf-8"?>
+<p:sld xmlns:a="http://schemas.openxmlformats.org/drawingml/2006/main" xmlns:r="http://schemas.openxmlformats.org/officeDocument/2006/relationships" xmlns:p="http://schemas.openxmlformats.org/presentationml/2006/main">
+  <p:cSld>
+    <p:bg>
+      <p:bgPr>
+        <a:solidFill>
+          <a:schemeClr val="bg2"/>
+        </a:solidFill>
+        <a:effectLst/>
+      </p:bgPr>
+    </p:bg>
+    <p:spTree>
+      <p:nvGrpSpPr>
+        <p:cNvPr id="1" name=""/>
+        <p:cNvGrpSpPr/>
+        <p:nvPr/>
+      </p:nvGrpSpPr>
+      <p:grpSpPr>
+        <a:xfrm>
+          <a:off x="0" y="0"/>
+          <a:ext cx="0" cy="0"/>
+          <a:chOff x="0" y="0"/>
+          <a:chExt cx="0" cy="0"/>
+        </a:xfrm>
+      </p:grpSpPr>
+      <p:sp>
+        <p:nvSpPr>
+          <p:cNvPr id="2" name="Title 1">
+            <a:extLst>
+              <a:ext uri="{FF2B5EF4-FFF2-40B4-BE49-F238E27FC236}">
+                <a16:creationId xmlns:a16="http://schemas.microsoft.com/office/drawing/2014/main" id="{FE3390AE-64F8-48D4-B054-58E9F20A117C}"/>
+              </a:ext>
+            </a:extLst>
+          </p:cNvPr>
+          <p:cNvSpPr>
+            <a:spLocks noGrp="1"/>
+          </p:cNvSpPr>
+          <p:nvPr>
+            <p:ph type="title"/>
+          </p:nvPr>
+        </p:nvSpPr>
+        <p:spPr>
+          <a:xfrm>
+            <a:off x="4419136" y="1020871"/>
+            <a:ext cx="6960759" cy="2849671"/>
+          </a:xfrm>
+        </p:spPr>
+        <p:txBody>
+          <a:bodyPr vert="horz" lIns="91440" tIns="45720" rIns="91440" bIns="45720" rtlCol="0" anchor="b">
+            <a:normAutofit/>
+          </a:bodyPr>
+          <a:lstStyle/>
+          <a:p>
+            <a:r>
+              <a:rPr lang="en-US" sz="6000">
+                <a:solidFill>
+                  <a:srgbClr val="FFFFFF"/>
+                </a:solidFill>
+              </a:rPr>
+              <a:t>Q&amp;A </a:t>
+            </a:r>
+          </a:p>
+        </p:txBody>
+      </p:sp>
+      <p:sp>
+        <p:nvSpPr>
+          <p:cNvPr id="3" name="Content Placeholder 2">
+            <a:extLst>
+              <a:ext uri="{FF2B5EF4-FFF2-40B4-BE49-F238E27FC236}">
+                <a16:creationId xmlns:a16="http://schemas.microsoft.com/office/drawing/2014/main" id="{3081C2D6-6485-4513-89B9-1A63DC04F193}"/>
+              </a:ext>
+            </a:extLst>
+          </p:cNvPr>
+          <p:cNvSpPr>
+            <a:spLocks noGrp="1"/>
+          </p:cNvSpPr>
+          <p:nvPr>
+            <p:ph idx="1"/>
+          </p:nvPr>
+        </p:nvSpPr>
+        <p:spPr>
+          <a:xfrm>
+            <a:off x="4456386" y="3962088"/>
+            <a:ext cx="6203795" cy="1186108"/>
+          </a:xfrm>
+        </p:spPr>
+        <p:txBody>
+          <a:bodyPr vert="horz" lIns="91440" tIns="45720" rIns="91440" bIns="45720" rtlCol="0" anchor="t">
+            <a:normAutofit/>
+          </a:bodyPr>
+          <a:lstStyle/>
+          <a:p>
+            <a:pPr marL="0" indent="0">
+              <a:buNone/>
+            </a:pPr>
+            <a:r>
+              <a:rPr lang="en-US">
+                <a:solidFill>
+                  <a:srgbClr val="FFFFFF">
+                    <a:alpha val="70000"/>
+                  </a:srgbClr>
+                </a:solidFill>
+                <a:effectLst/>
+              </a:rPr>
+              <a:t>We’d love to answer any questions you have about the Paradise Pet project and our journey so far.</a:t>
+            </a:r>
+            <a:endParaRPr lang="en-US">
+              <a:solidFill>
+                <a:srgbClr val="FFFFFF">
+                  <a:alpha val="70000"/>
+                </a:srgbClr>
+              </a:solidFill>
+            </a:endParaRPr>
+          </a:p>
+        </p:txBody>
+      </p:sp>
+    </p:spTree>
+    <p:extLst>
+      <p:ext uri="{BB962C8B-B14F-4D97-AF65-F5344CB8AC3E}">
+        <p14:creationId xmlns:p14="http://schemas.microsoft.com/office/powerpoint/2010/main" val="644934295"/>
+      </p:ext>
+    </p:extLst>
+  </p:cSld>
+  <p:clrMapOvr>
+    <a:overrideClrMapping bg1="dk1" tx1="lt1" bg2="dk2" tx2="lt2" accent1="accent1" accent2="accent2" accent3="accent3" accent4="accent4" accent5="accent5" accent6="accent6" hlink="hlink" folHlink="folHlink"/>
+  </p:clrMapOvr>
+</p:sld>
+</file>
+
 <file path=ppt/slides/slide2.xml><?xml version="1.0" encoding="utf-8"?>
 <p:sld xmlns:a="http://schemas.openxmlformats.org/drawingml/2006/main" xmlns:r="http://schemas.openxmlformats.org/officeDocument/2006/relationships" xmlns:p="http://schemas.openxmlformats.org/presentationml/2006/main">
   <p:cSld>
@@ -7058,10 +7578,10 @@
           <a:lstStyle/>
           <a:p>
             <a:r>
-              <a:rPr lang="en-US" b="1"/>
+              <a:rPr lang="en-US" b="1" dirty="0"/>
               <a:t>Introduction</a:t>
             </a:r>
-            <a:endParaRPr/>
+            <a:endParaRPr dirty="0"/>
           </a:p>
         </p:txBody>
       </p:sp>
@@ -7203,475 +7723,6 @@
       </p:grpSpPr>
       <p:sp>
         <p:nvSpPr>
-          <p:cNvPr id="2" name="Title 1">
-            <a:extLst>
-              <a:ext uri="{FF2B5EF4-FFF2-40B4-BE49-F238E27FC236}">
-                <a16:creationId xmlns:a16="http://schemas.microsoft.com/office/drawing/2014/main" id="{85A5E344-5CDF-69C4-7B9F-0A9D2F85FCF6}"/>
-              </a:ext>
-            </a:extLst>
-          </p:cNvPr>
-          <p:cNvSpPr>
-            <a:spLocks noGrp="1"/>
-          </p:cNvSpPr>
-          <p:nvPr>
-            <p:ph type="title"/>
-          </p:nvPr>
-        </p:nvSpPr>
-        <p:spPr/>
-        <p:txBody>
-          <a:bodyPr>
-            <a:normAutofit/>
-          </a:bodyPr>
-          <a:lstStyle/>
-          <a:p>
-            <a:r>
-              <a:rPr lang="en-US"/>
-              <a:t>Front End Progress</a:t>
-            </a:r>
-          </a:p>
-        </p:txBody>
-      </p:sp>
-      <p:sp>
-        <p:nvSpPr>
-          <p:cNvPr id="3" name="Content Placeholder 2">
-            <a:extLst>
-              <a:ext uri="{FF2B5EF4-FFF2-40B4-BE49-F238E27FC236}">
-                <a16:creationId xmlns:a16="http://schemas.microsoft.com/office/drawing/2014/main" id="{AA366A60-5DD9-513F-B101-7D1084B8658C}"/>
-              </a:ext>
-            </a:extLst>
-          </p:cNvPr>
-          <p:cNvSpPr>
-            <a:spLocks noGrp="1"/>
-          </p:cNvSpPr>
-          <p:nvPr>
-            <p:ph idx="1"/>
-          </p:nvPr>
-        </p:nvSpPr>
-        <p:spPr/>
-        <p:txBody>
-          <a:bodyPr vert="horz" lIns="91440" tIns="45720" rIns="91440" bIns="45720" rtlCol="0" anchor="t">
-            <a:normAutofit/>
-          </a:bodyPr>
-          <a:lstStyle/>
-          <a:p>
-            <a:endParaRPr lang="en-US">
-              <a:ea typeface="+mn-lt"/>
-              <a:cs typeface="+mn-lt"/>
-            </a:endParaRPr>
-          </a:p>
-          <a:p>
-            <a:endParaRPr lang="en-US"/>
-          </a:p>
-        </p:txBody>
-      </p:sp>
-      <p:sp>
-        <p:nvSpPr>
-          <p:cNvPr id="4" name="TextBox 3">
-            <a:extLst>
-              <a:ext uri="{FF2B5EF4-FFF2-40B4-BE49-F238E27FC236}">
-                <a16:creationId xmlns:a16="http://schemas.microsoft.com/office/drawing/2014/main" id="{83575F64-B09B-4C19-500C-A6CCF1C427AB}"/>
-              </a:ext>
-            </a:extLst>
-          </p:cNvPr>
-          <p:cNvSpPr txBox="1"/>
-          <p:nvPr/>
-        </p:nvSpPr>
-        <p:spPr>
-          <a:xfrm>
-            <a:off x="829234" y="1949823"/>
-            <a:ext cx="9782735" cy="2585323"/>
-          </a:xfrm>
-          <a:prstGeom prst="rect">
-            <a:avLst/>
-          </a:prstGeom>
-          <a:noFill/>
-        </p:spPr>
-        <p:txBody>
-          <a:bodyPr rot="0" spcFirstLastPara="0" vertOverflow="overflow" horzOverflow="overflow" vert="horz" wrap="square" lIns="91440" tIns="45720" rIns="91440" bIns="45720" numCol="1" spcCol="0" rtlCol="0" fromWordArt="0" anchor="t" anchorCtr="0" forceAA="0" compatLnSpc="1">
-            <a:prstTxWarp prst="textNoShape">
-              <a:avLst/>
-            </a:prstTxWarp>
-            <a:spAutoFit/>
-          </a:bodyPr>
-          <a:lstStyle/>
-          <a:p>
-            <a:r>
-              <a:rPr lang="en-US" dirty="0"/>
-              <a:t>Languages and Frameworks used: HTML5, CSS3, </a:t>
-            </a:r>
-            <a:r>
-              <a:rPr lang="en-US" dirty="0" err="1"/>
-              <a:t>Javascript</a:t>
-            </a:r>
-            <a:r>
-              <a:rPr lang="en-US" dirty="0"/>
-              <a:t>, CSS Framework Tailwind, </a:t>
-            </a:r>
-            <a:r>
-              <a:rPr lang="en-US" dirty="0" err="1"/>
-              <a:t>JQuery</a:t>
-            </a:r>
-            <a:r>
-              <a:rPr lang="en-US" dirty="0"/>
-              <a:t>.</a:t>
-            </a:r>
-          </a:p>
-          <a:p>
-            <a:endParaRPr lang="en-US" dirty="0"/>
-          </a:p>
-          <a:p>
-            <a:r>
-              <a:rPr lang="en-US" dirty="0"/>
-              <a:t>Work on Adoption Applications.</a:t>
-            </a:r>
-          </a:p>
-          <a:p>
-            <a:endParaRPr lang="en-US" dirty="0"/>
-          </a:p>
-          <a:p>
-            <a:r>
-              <a:rPr lang="en-US" dirty="0"/>
-              <a:t>Donated Page, where you can submit the amount, you want to donate to the organization.</a:t>
-            </a:r>
-          </a:p>
-          <a:p>
-            <a:endParaRPr lang="en-US" dirty="0"/>
-          </a:p>
-          <a:p>
-            <a:r>
-              <a:rPr lang="en-US" dirty="0"/>
-              <a:t>About Us/ Contact Us forms, gives information about Pet Paradise Rescue as well as the different types of Animals, and a Contact Us form where you can use your name and email address to ask any questions.</a:t>
-            </a:r>
-          </a:p>
-        </p:txBody>
-      </p:sp>
-    </p:spTree>
-    <p:extLst>
-      <p:ext uri="{BB962C8B-B14F-4D97-AF65-F5344CB8AC3E}">
-        <p14:creationId xmlns:p14="http://schemas.microsoft.com/office/powerpoint/2010/main" val="4259726629"/>
-      </p:ext>
-    </p:extLst>
-  </p:cSld>
-  <p:clrMapOvr>
-    <a:masterClrMapping/>
-  </p:clrMapOvr>
-</p:sld>
-</file>
-
-<file path=ppt/slides/slide4.xml><?xml version="1.0" encoding="utf-8"?>
-<p:sld xmlns:a="http://schemas.openxmlformats.org/drawingml/2006/main" xmlns:r="http://schemas.openxmlformats.org/officeDocument/2006/relationships" xmlns:p="http://schemas.openxmlformats.org/presentationml/2006/main">
-  <p:cSld>
-    <p:bg>
-      <p:bgPr>
-        <a:solidFill>
-          <a:schemeClr val="bg1"/>
-        </a:solidFill>
-        <a:effectLst/>
-      </p:bgPr>
-    </p:bg>
-    <p:spTree>
-      <p:nvGrpSpPr>
-        <p:cNvPr id="1" name=""/>
-        <p:cNvGrpSpPr/>
-        <p:nvPr/>
-      </p:nvGrpSpPr>
-      <p:grpSpPr>
-        <a:xfrm>
-          <a:off x="0" y="0"/>
-          <a:ext cx="0" cy="0"/>
-          <a:chOff x="0" y="0"/>
-          <a:chExt cx="0" cy="0"/>
-        </a:xfrm>
-      </p:grpSpPr>
-      <p:sp>
-        <p:nvSpPr>
-          <p:cNvPr id="2" name="Title 1"/>
-          <p:cNvSpPr>
-            <a:spLocks noGrp="1"/>
-          </p:cNvSpPr>
-          <p:nvPr>
-            <p:ph type="title"/>
-          </p:nvPr>
-        </p:nvSpPr>
-        <p:spPr/>
-        <p:txBody>
-          <a:bodyPr vert="horz" lIns="91440" tIns="45720" rIns="91440" bIns="45720" rtlCol="0" anchor="t">
-            <a:normAutofit/>
-          </a:bodyPr>
-          <a:lstStyle/>
-          <a:p>
-            <a:r>
-              <a:rPr lang="en-US" b="1" dirty="0"/>
-              <a:t>Database Integration Progress</a:t>
-            </a:r>
-            <a:endParaRPr lang="en-US" dirty="0"/>
-          </a:p>
-        </p:txBody>
-      </p:sp>
-      <p:sp>
-        <p:nvSpPr>
-          <p:cNvPr id="6" name="Content Placeholder 5">
-            <a:extLst>
-              <a:ext uri="{FF2B5EF4-FFF2-40B4-BE49-F238E27FC236}">
-                <a16:creationId xmlns:a16="http://schemas.microsoft.com/office/drawing/2014/main" id="{DA090DEF-BA2D-EFBE-C0C3-BA92EADBCFBA}"/>
-              </a:ext>
-            </a:extLst>
-          </p:cNvPr>
-          <p:cNvSpPr>
-            <a:spLocks noGrp="1"/>
-          </p:cNvSpPr>
-          <p:nvPr>
-            <p:ph idx="1"/>
-          </p:nvPr>
-        </p:nvSpPr>
-        <p:spPr/>
-        <p:txBody>
-          <a:bodyPr>
-            <a:normAutofit/>
-          </a:bodyPr>
-          <a:lstStyle/>
-          <a:p>
-            <a:r>
-              <a:rPr lang="en-US" dirty="0"/>
-              <a:t>Languages used: PHP</a:t>
-            </a:r>
-          </a:p>
-          <a:p>
-            <a:r>
-              <a:rPr lang="en-US" dirty="0"/>
-              <a:t>PHP Files Created in this milestone: </a:t>
-            </a:r>
-          </a:p>
-          <a:p>
-            <a:pPr lvl="1"/>
-            <a:r>
-              <a:rPr lang="en-US" dirty="0" err="1"/>
-              <a:t>database.php</a:t>
-            </a:r>
-            <a:endParaRPr lang="en-US" dirty="0"/>
-          </a:p>
-          <a:p>
-            <a:pPr lvl="2"/>
-            <a:r>
-              <a:rPr lang="en-US" dirty="0"/>
-              <a:t>Contains database connectivity settings</a:t>
-            </a:r>
-          </a:p>
-          <a:p>
-            <a:pPr lvl="2"/>
-            <a:r>
-              <a:rPr lang="en-US" dirty="0"/>
-              <a:t>Helps promote database security and prevents redundant code.</a:t>
-            </a:r>
-          </a:p>
-          <a:p>
-            <a:pPr lvl="1"/>
-            <a:r>
-              <a:rPr lang="en-US" dirty="0" err="1"/>
-              <a:t>fetch_pets.php</a:t>
-            </a:r>
-            <a:endParaRPr lang="en-US" dirty="0"/>
-          </a:p>
-          <a:p>
-            <a:pPr lvl="2"/>
-            <a:r>
-              <a:rPr lang="en-US" dirty="0"/>
-              <a:t>Creates </a:t>
-            </a:r>
-            <a:r>
-              <a:rPr lang="en-US" dirty="0" err="1"/>
-              <a:t>MySQl</a:t>
-            </a:r>
-            <a:r>
-              <a:rPr lang="en-US" dirty="0"/>
-              <a:t> query for Pets database, and outputs data as a JSON file.</a:t>
-            </a:r>
-          </a:p>
-          <a:p>
-            <a:pPr lvl="2"/>
-            <a:r>
-              <a:rPr lang="en-US" dirty="0" err="1"/>
-              <a:t>Javascript</a:t>
-            </a:r>
-            <a:r>
-              <a:rPr lang="en-US" dirty="0"/>
-              <a:t> file will read JSON file and allow popups to display information about each pet. </a:t>
-            </a:r>
-          </a:p>
-          <a:p>
-            <a:pPr lvl="2"/>
-            <a:endParaRPr lang="en-US" dirty="0"/>
-          </a:p>
-        </p:txBody>
-      </p:sp>
-    </p:spTree>
-    <p:extLst>
-      <p:ext uri="{BB962C8B-B14F-4D97-AF65-F5344CB8AC3E}">
-        <p14:creationId xmlns:p14="http://schemas.microsoft.com/office/powerpoint/2010/main" val="1475842300"/>
-      </p:ext>
-    </p:extLst>
-  </p:cSld>
-  <p:clrMapOvr>
-    <a:masterClrMapping/>
-  </p:clrMapOvr>
-</p:sld>
-</file>
-
-<file path=ppt/slides/slide5.xml><?xml version="1.0" encoding="utf-8"?>
-<p:sld xmlns:a="http://schemas.openxmlformats.org/drawingml/2006/main" xmlns:r="http://schemas.openxmlformats.org/officeDocument/2006/relationships" xmlns:p="http://schemas.openxmlformats.org/presentationml/2006/main">
-  <p:cSld>
-    <p:spTree>
-      <p:nvGrpSpPr>
-        <p:cNvPr id="1" name=""/>
-        <p:cNvGrpSpPr/>
-        <p:nvPr/>
-      </p:nvGrpSpPr>
-      <p:grpSpPr>
-        <a:xfrm>
-          <a:off x="0" y="0"/>
-          <a:ext cx="0" cy="0"/>
-          <a:chOff x="0" y="0"/>
-          <a:chExt cx="0" cy="0"/>
-        </a:xfrm>
-      </p:grpSpPr>
-      <p:sp>
-        <p:nvSpPr>
-          <p:cNvPr id="2" name="Title 1">
-            <a:extLst>
-              <a:ext uri="{FF2B5EF4-FFF2-40B4-BE49-F238E27FC236}">
-                <a16:creationId xmlns:a16="http://schemas.microsoft.com/office/drawing/2014/main" id="{0343E49E-DE3A-1CE8-3F09-80A619D1ED4C}"/>
-              </a:ext>
-            </a:extLst>
-          </p:cNvPr>
-          <p:cNvSpPr>
-            <a:spLocks noGrp="1"/>
-          </p:cNvSpPr>
-          <p:nvPr>
-            <p:ph type="title"/>
-          </p:nvPr>
-        </p:nvSpPr>
-        <p:spPr/>
-        <p:txBody>
-          <a:bodyPr/>
-          <a:lstStyle/>
-          <a:p>
-            <a:r>
-              <a:rPr lang="en-US" b="1" dirty="0"/>
-              <a:t>Database Integration Troubleshooting</a:t>
-            </a:r>
-          </a:p>
-        </p:txBody>
-      </p:sp>
-      <p:sp>
-        <p:nvSpPr>
-          <p:cNvPr id="3" name="Content Placeholder 2">
-            <a:extLst>
-              <a:ext uri="{FF2B5EF4-FFF2-40B4-BE49-F238E27FC236}">
-                <a16:creationId xmlns:a16="http://schemas.microsoft.com/office/drawing/2014/main" id="{6381D10C-78D1-D00E-A988-BF91247A5C7D}"/>
-              </a:ext>
-            </a:extLst>
-          </p:cNvPr>
-          <p:cNvSpPr>
-            <a:spLocks noGrp="1"/>
-          </p:cNvSpPr>
-          <p:nvPr>
-            <p:ph idx="1"/>
-          </p:nvPr>
-        </p:nvSpPr>
-        <p:spPr/>
-        <p:txBody>
-          <a:bodyPr/>
-          <a:lstStyle/>
-          <a:p>
-            <a:r>
-              <a:rPr lang="en-US" dirty="0"/>
-              <a:t>Ensuring the JSON file created by </a:t>
-            </a:r>
-            <a:r>
-              <a:rPr lang="en-US" dirty="0" err="1"/>
-              <a:t>fetch_pets</a:t>
-            </a:r>
-            <a:r>
-              <a:rPr lang="en-US" dirty="0"/>
-              <a:t> is formatted correctly</a:t>
-            </a:r>
-          </a:p>
-          <a:p>
-            <a:r>
-              <a:rPr lang="en-US" dirty="0"/>
-              <a:t>Ensuring </a:t>
-            </a:r>
-            <a:r>
-              <a:rPr lang="en-US" dirty="0" err="1"/>
-              <a:t>Javascript</a:t>
-            </a:r>
-            <a:r>
-              <a:rPr lang="en-US" dirty="0"/>
-              <a:t> file is able to read JSON file, and will generate pet information in each popup.</a:t>
-            </a:r>
-          </a:p>
-          <a:p>
-            <a:r>
-              <a:rPr lang="en-US" dirty="0"/>
-              <a:t>Converting </a:t>
-            </a:r>
-            <a:r>
-              <a:rPr lang="en-US" dirty="0" err="1"/>
-              <a:t>tinyInt</a:t>
-            </a:r>
-            <a:r>
-              <a:rPr lang="en-US" dirty="0"/>
-              <a:t> values from database, into ‘Yes’ and ‘No’ in </a:t>
-            </a:r>
-            <a:r>
-              <a:rPr lang="en-US" dirty="0" err="1"/>
-              <a:t>javascript</a:t>
-            </a:r>
-            <a:r>
-              <a:rPr lang="en-US" dirty="0"/>
-              <a:t> to make information more user friendly.</a:t>
-            </a:r>
-          </a:p>
-          <a:p>
-            <a:r>
-              <a:rPr lang="en-US" dirty="0"/>
-              <a:t>Although functional, the addition of the database integration in the Pet Search Page caused the format to change. Will work on correcting format in next Milestone.   </a:t>
-            </a:r>
-          </a:p>
-        </p:txBody>
-      </p:sp>
-    </p:spTree>
-    <p:extLst>
-      <p:ext uri="{BB962C8B-B14F-4D97-AF65-F5344CB8AC3E}">
-        <p14:creationId xmlns:p14="http://schemas.microsoft.com/office/powerpoint/2010/main" val="3233425778"/>
-      </p:ext>
-    </p:extLst>
-  </p:cSld>
-  <p:clrMapOvr>
-    <a:masterClrMapping/>
-  </p:clrMapOvr>
-</p:sld>
-</file>
-
-<file path=ppt/slides/slide6.xml><?xml version="1.0" encoding="utf-8"?>
-<p:sld xmlns:a="http://schemas.openxmlformats.org/drawingml/2006/main" xmlns:r="http://schemas.openxmlformats.org/officeDocument/2006/relationships" xmlns:p="http://schemas.openxmlformats.org/presentationml/2006/main">
-  <p:cSld>
-    <p:spTree>
-      <p:nvGrpSpPr>
-        <p:cNvPr id="1" name=""/>
-        <p:cNvGrpSpPr/>
-        <p:nvPr/>
-      </p:nvGrpSpPr>
-      <p:grpSpPr>
-        <a:xfrm>
-          <a:off x="0" y="0"/>
-          <a:ext cx="0" cy="0"/>
-          <a:chOff x="0" y="0"/>
-          <a:chExt cx="0" cy="0"/>
-        </a:xfrm>
-      </p:grpSpPr>
-      <p:sp>
-        <p:nvSpPr>
           <p:cNvPr id="2" name="Title 1"/>
           <p:cNvSpPr>
             <a:spLocks noGrp="1"/>
@@ -7687,14 +7738,23 @@
           </a:xfrm>
         </p:spPr>
         <p:txBody>
-          <a:bodyPr/>
-          <a:lstStyle/>
-          <a:p>
-            <a:r>
-              <a:rPr lang="en-US" b="1"/>
+          <a:bodyPr>
+            <a:normAutofit fontScale="90000"/>
+          </a:bodyPr>
+          <a:lstStyle/>
+          <a:p>
+            <a:r>
+              <a:rPr lang="en-US" b="1" dirty="0"/>
               <a:t>Gantt Chart</a:t>
             </a:r>
-            <a:endParaRPr/>
+            <a:br>
+              <a:rPr lang="en-US" b="1" dirty="0"/>
+            </a:br>
+            <a:r>
+              <a:rPr lang="en-US" b="1" dirty="0"/>
+              <a:t>From: 4/15 – 22 (Presentation Day)</a:t>
+            </a:r>
+            <a:endParaRPr b="1" dirty="0"/>
           </a:p>
         </p:txBody>
       </p:sp>
@@ -7726,8 +7786,8 @@
         </p:blipFill>
         <p:spPr>
           <a:xfrm>
-            <a:off x="331060" y="1131443"/>
-            <a:ext cx="9449619" cy="2926334"/>
+            <a:off x="331060" y="1942146"/>
+            <a:ext cx="11323217" cy="3506545"/>
           </a:xfrm>
           <a:prstGeom prst="rect">
             <a:avLst/>
@@ -7747,7 +7807,7 @@
 </p:sld>
 </file>
 
-<file path=ppt/slides/slide7.xml><?xml version="1.0" encoding="utf-8"?>
+<file path=ppt/slides/slide4.xml><?xml version="1.0" encoding="utf-8"?>
 <p:sld xmlns:a="http://schemas.openxmlformats.org/drawingml/2006/main" xmlns:r="http://schemas.openxmlformats.org/officeDocument/2006/relationships" xmlns:p="http://schemas.openxmlformats.org/presentationml/2006/main">
   <p:cSld>
     <p:spTree>
@@ -7764,12 +7824,48 @@
           <a:chExt cx="0" cy="0"/>
         </a:xfrm>
       </p:grpSpPr>
+      <p:pic>
+        <p:nvPicPr>
+          <p:cNvPr id="4" name="Picture 3" descr="A screenshot of a computer&#10;&#10;Description automatically generated">
+            <a:extLst>
+              <a:ext uri="{FF2B5EF4-FFF2-40B4-BE49-F238E27FC236}">
+                <a16:creationId xmlns:a16="http://schemas.microsoft.com/office/drawing/2014/main" id="{9B5864CC-8E66-AD7C-DFC4-E4118F4C6399}"/>
+              </a:ext>
+            </a:extLst>
+          </p:cNvPr>
+          <p:cNvPicPr>
+            <a:picLocks noChangeAspect="1"/>
+          </p:cNvPicPr>
+          <p:nvPr/>
+        </p:nvPicPr>
+        <p:blipFill>
+          <a:blip r:embed="rId2">
+            <a:extLst>
+              <a:ext uri="{28A0092B-C50C-407E-A947-70E740481C1C}">
+                <a14:useLocalDpi xmlns:a14="http://schemas.microsoft.com/office/drawing/2010/main" val="0"/>
+              </a:ext>
+            </a:extLst>
+          </a:blip>
+          <a:stretch>
+            <a:fillRect/>
+          </a:stretch>
+        </p:blipFill>
+        <p:spPr>
+          <a:xfrm>
+            <a:off x="0" y="0"/>
+            <a:ext cx="12192000" cy="6858000"/>
+          </a:xfrm>
+          <a:prstGeom prst="rect">
+            <a:avLst/>
+          </a:prstGeom>
+        </p:spPr>
+      </p:pic>
       <p:sp>
         <p:nvSpPr>
           <p:cNvPr id="2" name="Title 1">
             <a:extLst>
               <a:ext uri="{FF2B5EF4-FFF2-40B4-BE49-F238E27FC236}">
-                <a16:creationId xmlns:a16="http://schemas.microsoft.com/office/drawing/2014/main" id="{9E8CE07C-7C33-4080-BBF9-0DE5A31ECE31}"/>
+                <a16:creationId xmlns:a16="http://schemas.microsoft.com/office/drawing/2014/main" id="{9934676F-72F9-DC98-C9BD-F03256E9B81C}"/>
               </a:ext>
             </a:extLst>
           </p:cNvPr>
@@ -7780,14 +7876,99 @@
             <p:ph type="title"/>
           </p:nvPr>
         </p:nvSpPr>
+        <p:spPr>
+          <a:xfrm>
+            <a:off x="253127" y="864124"/>
+            <a:ext cx="8596668" cy="766713"/>
+          </a:xfrm>
+        </p:spPr>
+        <p:txBody>
+          <a:bodyPr/>
+          <a:lstStyle/>
+          <a:p>
+            <a:r>
+              <a:rPr lang="en-US" sz="3200" b="1" dirty="0">
+                <a:highlight>
+                  <a:srgbClr val="000000"/>
+                </a:highlight>
+              </a:rPr>
+              <a:t>Our</a:t>
+            </a:r>
+            <a:r>
+              <a:rPr lang="en-US" dirty="0">
+                <a:highlight>
+                  <a:srgbClr val="000000"/>
+                </a:highlight>
+              </a:rPr>
+              <a:t> </a:t>
+            </a:r>
+            <a:r>
+              <a:rPr lang="en-US" sz="3200" b="1" dirty="0">
+                <a:highlight>
+                  <a:srgbClr val="000000"/>
+                </a:highlight>
+              </a:rPr>
+              <a:t>Pets Search Page</a:t>
+            </a:r>
+          </a:p>
+        </p:txBody>
+      </p:sp>
+    </p:spTree>
+    <p:extLst>
+      <p:ext uri="{BB962C8B-B14F-4D97-AF65-F5344CB8AC3E}">
+        <p14:creationId xmlns:p14="http://schemas.microsoft.com/office/powerpoint/2010/main" val="3477758370"/>
+      </p:ext>
+    </p:extLst>
+  </p:cSld>
+  <p:clrMapOvr>
+    <a:masterClrMapping/>
+  </p:clrMapOvr>
+</p:sld>
+</file>
+
+<file path=ppt/slides/slide5.xml><?xml version="1.0" encoding="utf-8"?>
+<p:sld xmlns:a="http://schemas.openxmlformats.org/drawingml/2006/main" xmlns:r="http://schemas.openxmlformats.org/officeDocument/2006/relationships" xmlns:p="http://schemas.openxmlformats.org/presentationml/2006/main">
+  <p:cSld>
+    <p:spTree>
+      <p:nvGrpSpPr>
+        <p:cNvPr id="1" name=""/>
+        <p:cNvGrpSpPr/>
+        <p:nvPr/>
+      </p:nvGrpSpPr>
+      <p:grpSpPr>
+        <a:xfrm>
+          <a:off x="0" y="0"/>
+          <a:ext cx="0" cy="0"/>
+          <a:chOff x="0" y="0"/>
+          <a:chExt cx="0" cy="0"/>
+        </a:xfrm>
+      </p:grpSpPr>
+      <p:sp>
+        <p:nvSpPr>
+          <p:cNvPr id="2" name="Title 1">
+            <a:extLst>
+              <a:ext uri="{FF2B5EF4-FFF2-40B4-BE49-F238E27FC236}">
+                <a16:creationId xmlns:a16="http://schemas.microsoft.com/office/drawing/2014/main" id="{85A5E344-5CDF-69C4-7B9F-0A9D2F85FCF6}"/>
+              </a:ext>
+            </a:extLst>
+          </p:cNvPr>
+          <p:cNvSpPr>
+            <a:spLocks noGrp="1"/>
+          </p:cNvSpPr>
+          <p:nvPr>
+            <p:ph type="title"/>
+          </p:nvPr>
+        </p:nvSpPr>
         <p:spPr/>
         <p:txBody>
-          <a:bodyPr/>
-          <a:lstStyle/>
-          <a:p>
-            <a:r>
-              <a:rPr lang="en-US"/>
-              <a:t>GitHub Repository</a:t>
+          <a:bodyPr>
+            <a:normAutofit/>
+          </a:bodyPr>
+          <a:lstStyle/>
+          <a:p>
+            <a:r>
+              <a:rPr lang="en-US" sz="3200" b="1" dirty="0"/>
+              <a:t>Front End Progress</a:t>
             </a:r>
           </a:p>
         </p:txBody>
@@ -7797,7 +7978,7 @@
           <p:cNvPr id="3" name="Content Placeholder 2">
             <a:extLst>
               <a:ext uri="{FF2B5EF4-FFF2-40B4-BE49-F238E27FC236}">
-                <a16:creationId xmlns:a16="http://schemas.microsoft.com/office/drawing/2014/main" id="{4D1D71C0-6725-492A-A79E-FB02E8C2E4E9}"/>
+                <a16:creationId xmlns:a16="http://schemas.microsoft.com/office/drawing/2014/main" id="{AA366A60-5DD9-513F-B101-7D1084B8658C}"/>
               </a:ext>
             </a:extLst>
           </p:cNvPr>
@@ -7808,88 +7989,662 @@
             <p:ph idx="1"/>
           </p:nvPr>
         </p:nvSpPr>
-        <p:spPr/>
-        <p:txBody>
-          <a:bodyPr/>
-          <a:lstStyle/>
-          <a:p>
-            <a:pPr marL="0" indent="0">
-              <a:spcBef>
-                <a:spcPts val="0"/>
-              </a:spcBef>
-              <a:spcAft>
-                <a:spcPts val="0"/>
-              </a:spcAft>
-              <a:buNone/>
+        <p:spPr>
+          <a:xfrm>
+            <a:off x="4637988" y="1151921"/>
+            <a:ext cx="6876678" cy="5096479"/>
+          </a:xfrm>
+        </p:spPr>
+        <p:txBody>
+          <a:bodyPr vert="horz" lIns="91440" tIns="45720" rIns="91440" bIns="45720" rtlCol="0" anchor="t">
+            <a:normAutofit/>
+          </a:bodyPr>
+          <a:lstStyle/>
+          <a:p>
+            <a:pPr>
+              <a:lnSpc>
+                <a:spcPct val="150000"/>
+              </a:lnSpc>
             </a:pPr>
-            <a:r>
-              <a:rPr lang="en-US"/>
-              <a:t>Rancor Group GitHub Link:</a:t>
-            </a:r>
-            <a:endParaRPr lang="en-US" sz="1600"/>
-          </a:p>
-          <a:p>
-            <a:pPr marL="0" indent="0">
-              <a:spcBef>
-                <a:spcPts val="0"/>
-              </a:spcBef>
-              <a:spcAft>
-                <a:spcPts val="0"/>
-              </a:spcAft>
-              <a:buNone/>
+            <a:endParaRPr lang="en-US" dirty="0">
+              <a:ea typeface="+mn-lt"/>
+              <a:cs typeface="+mn-lt"/>
+            </a:endParaRPr>
+          </a:p>
+          <a:p>
+            <a:pPr>
+              <a:lnSpc>
+                <a:spcPct val="150000"/>
+              </a:lnSpc>
             </a:pPr>
-            <a:endParaRPr lang="en-US" sz="2000" u="sng" kern="100">
-              <a:solidFill>
-                <a:srgbClr val="0563C1"/>
-              </a:solidFill>
-              <a:latin typeface="Calibri" panose="020F0502020204030204" pitchFamily="34" charset="0"/>
-              <a:ea typeface="Calibri" panose="020F0502020204030204" pitchFamily="34" charset="0"/>
-              <a:cs typeface="Times New Roman" panose="02020603050405020304" pitchFamily="18" charset="0"/>
-              <a:hlinkClick r:id="rId2"/>
-            </a:endParaRPr>
-          </a:p>
-          <a:p>
-            <a:pPr marL="0" indent="0">
-              <a:spcBef>
-                <a:spcPts val="0"/>
-              </a:spcBef>
-              <a:spcAft>
-                <a:spcPts val="0"/>
-              </a:spcAft>
-              <a:buNone/>
+            <a:r>
+              <a:rPr lang="en-US" dirty="0"/>
+              <a:t>Designed a new page dedicated for searching pets, based on  the </a:t>
+            </a:r>
+            <a:r>
+              <a:rPr lang="en-US" dirty="0">
+                <a:hlinkClick r:id="rId3"/>
+              </a:rPr>
+              <a:t>Orange County Animal Service website</a:t>
+            </a:r>
+            <a:r>
+              <a:rPr lang="en-US" dirty="0"/>
+              <a:t>:</a:t>
+            </a:r>
+          </a:p>
+          <a:p>
+            <a:pPr lvl="1">
+              <a:lnSpc>
+                <a:spcPct val="150000"/>
+              </a:lnSpc>
+              <a:buFont typeface="Wingdings" panose="05000000000000000000" pitchFamily="2" charset="2"/>
+              <a:buChar char="§"/>
             </a:pPr>
             <a:r>
-              <a:rPr lang="en-US" sz="2000" u="sng" kern="100">
-                <a:solidFill>
-                  <a:srgbClr val="0563C1"/>
-                </a:solidFill>
-                <a:effectLst/>
-                <a:latin typeface="Calibri" panose="020F0502020204030204" pitchFamily="34" charset="0"/>
-                <a:ea typeface="Calibri" panose="020F0502020204030204" pitchFamily="34" charset="0"/>
-                <a:cs typeface="Times New Roman" panose="02020603050405020304" pitchFamily="18" charset="0"/>
-                <a:hlinkClick r:id="rId2"/>
-              </a:rPr>
-              <a:t>https://github.com/RobertDevaney/ParadisePetRescue</a:t>
-            </a:r>
-            <a:endParaRPr lang="en-US" sz="2000" kern="100">
-              <a:effectLst/>
-              <a:latin typeface="Calibri" panose="020F0502020204030204" pitchFamily="34" charset="0"/>
-              <a:ea typeface="Calibri" panose="020F0502020204030204" pitchFamily="34" charset="0"/>
-              <a:cs typeface="Times New Roman" panose="02020603050405020304" pitchFamily="18" charset="0"/>
-            </a:endParaRPr>
-          </a:p>
-          <a:p>
-            <a:endParaRPr lang="en-US"/>
-          </a:p>
-          <a:p>
-            <a:endParaRPr lang="en-US"/>
+              <a:rPr lang="en-US" sz="1800" dirty="0"/>
+              <a:t>Included a distinct slot for each pet to be displayed on the page</a:t>
+            </a:r>
+          </a:p>
+          <a:p>
+            <a:pPr lvl="1">
+              <a:lnSpc>
+                <a:spcPct val="150000"/>
+              </a:lnSpc>
+              <a:buFont typeface="Wingdings" panose="05000000000000000000" pitchFamily="2" charset="2"/>
+              <a:buChar char="§"/>
+            </a:pPr>
+            <a:r>
+              <a:rPr lang="en-US" sz="1800" dirty="0"/>
+              <a:t>Featured a filter section &amp; search bar for refining searches</a:t>
+            </a:r>
+          </a:p>
+          <a:p>
+            <a:pPr lvl="1">
+              <a:lnSpc>
+                <a:spcPct val="150000"/>
+              </a:lnSpc>
+              <a:buFont typeface="Wingdings" panose="05000000000000000000" pitchFamily="2" charset="2"/>
+              <a:buChar char="§"/>
+            </a:pPr>
+            <a:r>
+              <a:rPr lang="en-US" sz="1800" dirty="0"/>
+              <a:t>A pop-up window of further info for a pet whenever its slot is clicked</a:t>
+            </a:r>
+          </a:p>
+          <a:p>
+            <a:pPr lvl="1">
+              <a:lnSpc>
+                <a:spcPct val="150000"/>
+              </a:lnSpc>
+              <a:buFont typeface="Wingdings" panose="05000000000000000000" pitchFamily="2" charset="2"/>
+              <a:buChar char="§"/>
+            </a:pPr>
+            <a:endParaRPr lang="en-US" sz="1800" dirty="0"/>
+          </a:p>
+        </p:txBody>
+      </p:sp>
+      <p:sp>
+        <p:nvSpPr>
+          <p:cNvPr id="4" name="TextBox 3">
+            <a:extLst>
+              <a:ext uri="{FF2B5EF4-FFF2-40B4-BE49-F238E27FC236}">
+                <a16:creationId xmlns:a16="http://schemas.microsoft.com/office/drawing/2014/main" id="{83575F64-B09B-4C19-500C-A6CCF1C427AB}"/>
+              </a:ext>
+            </a:extLst>
+          </p:cNvPr>
+          <p:cNvSpPr txBox="1"/>
+          <p:nvPr/>
+        </p:nvSpPr>
+        <p:spPr>
+          <a:xfrm>
+            <a:off x="677334" y="1515652"/>
+            <a:ext cx="3225363" cy="3330848"/>
+          </a:xfrm>
+          <a:prstGeom prst="rect">
+            <a:avLst/>
+          </a:prstGeom>
+          <a:noFill/>
+        </p:spPr>
+        <p:txBody>
+          <a:bodyPr rot="0" spcFirstLastPara="0" vertOverflow="overflow" horzOverflow="overflow" vert="horz" wrap="square" lIns="91440" tIns="45720" rIns="91440" bIns="45720" numCol="1" spcCol="0" rtlCol="0" fromWordArt="0" anchor="t" anchorCtr="0" forceAA="0" compatLnSpc="1">
+            <a:prstTxWarp prst="textNoShape">
+              <a:avLst/>
+            </a:prstTxWarp>
+            <a:spAutoFit/>
+          </a:bodyPr>
+          <a:lstStyle/>
+          <a:p>
+            <a:pPr>
+              <a:lnSpc>
+                <a:spcPct val="200000"/>
+              </a:lnSpc>
+            </a:pPr>
+            <a:r>
+              <a:rPr lang="en-US" b="1" dirty="0"/>
+              <a:t>Languages/Frameworks:</a:t>
+            </a:r>
+            <a:r>
+              <a:rPr lang="en-US" dirty="0"/>
+              <a:t> </a:t>
+            </a:r>
+          </a:p>
+          <a:p>
+            <a:pPr marL="285750" indent="-285750">
+              <a:lnSpc>
+                <a:spcPct val="200000"/>
+              </a:lnSpc>
+              <a:buFont typeface="Arial" panose="020B0604020202020204" pitchFamily="34" charset="0"/>
+              <a:buChar char="•"/>
+            </a:pPr>
+            <a:r>
+              <a:rPr lang="en-US" dirty="0"/>
+              <a:t>HTML5</a:t>
+            </a:r>
+          </a:p>
+          <a:p>
+            <a:pPr marL="285750" indent="-285750">
+              <a:lnSpc>
+                <a:spcPct val="200000"/>
+              </a:lnSpc>
+              <a:buFont typeface="Arial" panose="020B0604020202020204" pitchFamily="34" charset="0"/>
+              <a:buChar char="•"/>
+            </a:pPr>
+            <a:r>
+              <a:rPr lang="en-US" dirty="0"/>
+              <a:t>CSS3</a:t>
+            </a:r>
+          </a:p>
+          <a:p>
+            <a:pPr marL="285750" indent="-285750">
+              <a:lnSpc>
+                <a:spcPct val="200000"/>
+              </a:lnSpc>
+              <a:buFont typeface="Arial" panose="020B0604020202020204" pitchFamily="34" charset="0"/>
+              <a:buChar char="•"/>
+            </a:pPr>
+            <a:r>
+              <a:rPr lang="en-US" dirty="0"/>
+              <a:t>JavaScript</a:t>
+            </a:r>
+          </a:p>
+          <a:p>
+            <a:pPr marL="285750" indent="-285750">
+              <a:lnSpc>
+                <a:spcPct val="200000"/>
+              </a:lnSpc>
+              <a:buFont typeface="Arial" panose="020B0604020202020204" pitchFamily="34" charset="0"/>
+              <a:buChar char="•"/>
+            </a:pPr>
+            <a:r>
+              <a:rPr lang="en-US" dirty="0"/>
+              <a:t>CSS Framework Tailwind</a:t>
+            </a:r>
+          </a:p>
+          <a:p>
+            <a:pPr marL="285750" indent="-285750">
+              <a:lnSpc>
+                <a:spcPct val="200000"/>
+              </a:lnSpc>
+              <a:buFont typeface="Arial" panose="020B0604020202020204" pitchFamily="34" charset="0"/>
+              <a:buChar char="•"/>
+            </a:pPr>
+            <a:r>
+              <a:rPr lang="en-US" dirty="0" err="1"/>
+              <a:t>JQuery</a:t>
+            </a:r>
+            <a:endParaRPr lang="en-US" dirty="0"/>
           </a:p>
         </p:txBody>
       </p:sp>
     </p:spTree>
     <p:extLst>
       <p:ext uri="{BB962C8B-B14F-4D97-AF65-F5344CB8AC3E}">
-        <p14:creationId xmlns:p14="http://schemas.microsoft.com/office/powerpoint/2010/main" val="3166160437"/>
+        <p14:creationId xmlns:p14="http://schemas.microsoft.com/office/powerpoint/2010/main" val="4259726629"/>
+      </p:ext>
+    </p:extLst>
+  </p:cSld>
+  <p:clrMapOvr>
+    <a:masterClrMapping/>
+  </p:clrMapOvr>
+</p:sld>
+</file>
+
+<file path=ppt/slides/slide6.xml><?xml version="1.0" encoding="utf-8"?>
+<p:sld xmlns:a="http://schemas.openxmlformats.org/drawingml/2006/main" xmlns:r="http://schemas.openxmlformats.org/officeDocument/2006/relationships" xmlns:p="http://schemas.openxmlformats.org/presentationml/2006/main">
+  <p:cSld>
+    <p:spTree>
+      <p:nvGrpSpPr>
+        <p:cNvPr id="1" name=""/>
+        <p:cNvGrpSpPr/>
+        <p:nvPr/>
+      </p:nvGrpSpPr>
+      <p:grpSpPr>
+        <a:xfrm>
+          <a:off x="0" y="0"/>
+          <a:ext cx="0" cy="0"/>
+          <a:chOff x="0" y="0"/>
+          <a:chExt cx="0" cy="0"/>
+        </a:xfrm>
+      </p:grpSpPr>
+      <p:pic>
+        <p:nvPicPr>
+          <p:cNvPr id="4" name="Online Media 3" title="Presentation #4">
+            <a:hlinkClick r:id="" action="ppaction://media"/>
+            <a:extLst>
+              <a:ext uri="{FF2B5EF4-FFF2-40B4-BE49-F238E27FC236}">
+                <a16:creationId xmlns:a16="http://schemas.microsoft.com/office/drawing/2014/main" id="{66737557-5169-79E9-D220-3BD5A8F052F5}"/>
+              </a:ext>
+            </a:extLst>
+          </p:cNvPr>
+          <p:cNvPicPr>
+            <a:picLocks noGrp="1" noRot="1" noChangeAspect="1"/>
+          </p:cNvPicPr>
+          <p:nvPr>
+            <p:ph idx="1"/>
+            <a:videoFile r:link="rId1"/>
+          </p:nvPr>
+        </p:nvPicPr>
+        <p:blipFill>
+          <a:blip r:embed="rId3"/>
+          <a:stretch>
+            <a:fillRect/>
+          </a:stretch>
+        </p:blipFill>
+        <p:spPr>
+          <a:xfrm>
+            <a:off x="0" y="0"/>
+            <a:ext cx="12192000" cy="6889170"/>
+          </a:xfrm>
+          <a:prstGeom prst="rect">
+            <a:avLst/>
+          </a:prstGeom>
+        </p:spPr>
+      </p:pic>
+      <p:sp>
+        <p:nvSpPr>
+          <p:cNvPr id="2" name="Title 1">
+            <a:extLst>
+              <a:ext uri="{FF2B5EF4-FFF2-40B4-BE49-F238E27FC236}">
+                <a16:creationId xmlns:a16="http://schemas.microsoft.com/office/drawing/2014/main" id="{D9FF6A8C-5306-34D5-748D-4BFEE93A0CAC}"/>
+              </a:ext>
+            </a:extLst>
+          </p:cNvPr>
+          <p:cNvSpPr>
+            <a:spLocks noGrp="1"/>
+          </p:cNvSpPr>
+          <p:nvPr>
+            <p:ph type="title"/>
+          </p:nvPr>
+        </p:nvSpPr>
+        <p:spPr>
+          <a:xfrm>
+            <a:off x="517078" y="157114"/>
+            <a:ext cx="8596668" cy="1320800"/>
+          </a:xfrm>
+        </p:spPr>
+        <p:txBody>
+          <a:bodyPr vert="horz" lIns="91440" tIns="45720" rIns="91440" bIns="45720" rtlCol="0" anchor="t">
+            <a:normAutofit/>
+          </a:bodyPr>
+          <a:lstStyle/>
+          <a:p>
+            <a:r>
+              <a:rPr lang="en-US" sz="3200" b="1" dirty="0">
+                <a:highlight>
+                  <a:srgbClr val="000000"/>
+                </a:highlight>
+              </a:rPr>
+              <a:t>Celeste’s Video</a:t>
+            </a:r>
+          </a:p>
+        </p:txBody>
+      </p:sp>
+    </p:spTree>
+    <p:extLst>
+      <p:ext uri="{BB962C8B-B14F-4D97-AF65-F5344CB8AC3E}">
+        <p14:creationId xmlns:p14="http://schemas.microsoft.com/office/powerpoint/2010/main" val="1200203733"/>
+      </p:ext>
+    </p:extLst>
+  </p:cSld>
+  <p:clrMapOvr>
+    <a:masterClrMapping/>
+  </p:clrMapOvr>
+  <p:timing>
+    <p:tnLst>
+      <p:par>
+        <p:cTn id="1" dur="indefinite" restart="never" nodeType="tmRoot">
+          <p:childTnLst>
+            <p:seq concurrent="1" nextAc="seek">
+              <p:cTn id="2" dur="indefinite" nodeType="mainSeq">
+                <p:childTnLst>
+                  <p:par>
+                    <p:cTn id="3" fill="hold">
+                      <p:stCondLst>
+                        <p:cond delay="indefinite"/>
+                      </p:stCondLst>
+                      <p:childTnLst>
+                        <p:par>
+                          <p:cTn id="4" fill="hold">
+                            <p:stCondLst>
+                              <p:cond delay="0"/>
+                            </p:stCondLst>
+                            <p:childTnLst>
+                              <p:par>
+                                <p:cTn id="5" presetID="1" presetClass="mediacall" presetSubtype="0" fill="hold" nodeType="clickEffect">
+                                  <p:stCondLst>
+                                    <p:cond delay="0"/>
+                                  </p:stCondLst>
+                                  <p:childTnLst>
+                                    <p:cmd type="call" cmd="playFrom(0.0)">
+                                      <p:cBhvr>
+                                        <p:cTn id="6" dur="1" fill="hold"/>
+                                        <p:tgtEl>
+                                          <p:spTgt spid="4"/>
+                                        </p:tgtEl>
+                                      </p:cBhvr>
+                                    </p:cmd>
+                                  </p:childTnLst>
+                                </p:cTn>
+                              </p:par>
+                            </p:childTnLst>
+                          </p:cTn>
+                        </p:par>
+                      </p:childTnLst>
+                    </p:cTn>
+                  </p:par>
+                </p:childTnLst>
+              </p:cTn>
+              <p:prevCondLst>
+                <p:cond evt="onPrev" delay="0">
+                  <p:tgtEl>
+                    <p:sldTgt/>
+                  </p:tgtEl>
+                </p:cond>
+              </p:prevCondLst>
+              <p:nextCondLst>
+                <p:cond evt="onNext" delay="0">
+                  <p:tgtEl>
+                    <p:sldTgt/>
+                  </p:tgtEl>
+                </p:cond>
+              </p:nextCondLst>
+            </p:seq>
+            <p:video>
+              <p:cMediaNode vol="80000">
+                <p:cTn id="7" fill="hold" display="0">
+                  <p:stCondLst>
+                    <p:cond delay="indefinite"/>
+                  </p:stCondLst>
+                </p:cTn>
+                <p:tgtEl>
+                  <p:spTgt spid="4"/>
+                </p:tgtEl>
+              </p:cMediaNode>
+            </p:video>
+            <p:seq concurrent="1" nextAc="seek">
+              <p:cTn id="8" restart="whenNotActive" fill="hold" evtFilter="cancelBubble" nodeType="interactiveSeq">
+                <p:stCondLst>
+                  <p:cond evt="onClick" delay="0">
+                    <p:tgtEl>
+                      <p:spTgt spid="4"/>
+                    </p:tgtEl>
+                  </p:cond>
+                </p:stCondLst>
+                <p:endSync evt="end" delay="0">
+                  <p:rtn val="all"/>
+                </p:endSync>
+                <p:childTnLst>
+                  <p:par>
+                    <p:cTn id="9" fill="hold">
+                      <p:stCondLst>
+                        <p:cond delay="0"/>
+                      </p:stCondLst>
+                      <p:childTnLst>
+                        <p:par>
+                          <p:cTn id="10" fill="hold">
+                            <p:stCondLst>
+                              <p:cond delay="0"/>
+                            </p:stCondLst>
+                            <p:childTnLst>
+                              <p:par>
+                                <p:cTn id="11" presetID="2" presetClass="mediacall" presetSubtype="0" fill="hold" nodeType="clickEffect">
+                                  <p:stCondLst>
+                                    <p:cond delay="0"/>
+                                  </p:stCondLst>
+                                  <p:childTnLst>
+                                    <p:cmd type="call" cmd="togglePause">
+                                      <p:cBhvr>
+                                        <p:cTn id="12" dur="1" fill="hold"/>
+                                        <p:tgtEl>
+                                          <p:spTgt spid="4"/>
+                                        </p:tgtEl>
+                                      </p:cBhvr>
+                                    </p:cmd>
+                                  </p:childTnLst>
+                                </p:cTn>
+                              </p:par>
+                            </p:childTnLst>
+                          </p:cTn>
+                        </p:par>
+                      </p:childTnLst>
+                    </p:cTn>
+                  </p:par>
+                </p:childTnLst>
+              </p:cTn>
+              <p:nextCondLst>
+                <p:cond evt="onClick" delay="0">
+                  <p:tgtEl>
+                    <p:spTgt spid="4"/>
+                  </p:tgtEl>
+                </p:cond>
+              </p:nextCondLst>
+            </p:seq>
+          </p:childTnLst>
+        </p:cTn>
+      </p:par>
+    </p:tnLst>
+  </p:timing>
+</p:sld>
+</file>
+
+<file path=ppt/slides/slide7.xml><?xml version="1.0" encoding="utf-8"?>
+<p:sld xmlns:a="http://schemas.openxmlformats.org/drawingml/2006/main" xmlns:r="http://schemas.openxmlformats.org/officeDocument/2006/relationships" xmlns:p="http://schemas.openxmlformats.org/presentationml/2006/main">
+  <p:cSld>
+    <p:bg>
+      <p:bgPr>
+        <a:solidFill>
+          <a:schemeClr val="bg1"/>
+        </a:solidFill>
+        <a:effectLst/>
+      </p:bgPr>
+    </p:bg>
+    <p:spTree>
+      <p:nvGrpSpPr>
+        <p:cNvPr id="1" name=""/>
+        <p:cNvGrpSpPr/>
+        <p:nvPr/>
+      </p:nvGrpSpPr>
+      <p:grpSpPr>
+        <a:xfrm>
+          <a:off x="0" y="0"/>
+          <a:ext cx="0" cy="0"/>
+          <a:chOff x="0" y="0"/>
+          <a:chExt cx="0" cy="0"/>
+        </a:xfrm>
+      </p:grpSpPr>
+      <p:sp>
+        <p:nvSpPr>
+          <p:cNvPr id="2" name="Title 1"/>
+          <p:cNvSpPr>
+            <a:spLocks noGrp="1"/>
+          </p:cNvSpPr>
+          <p:nvPr>
+            <p:ph type="title"/>
+          </p:nvPr>
+        </p:nvSpPr>
+        <p:spPr/>
+        <p:txBody>
+          <a:bodyPr vert="horz" lIns="91440" tIns="45720" rIns="91440" bIns="45720" rtlCol="0" anchor="t">
+            <a:normAutofit/>
+          </a:bodyPr>
+          <a:lstStyle/>
+          <a:p>
+            <a:r>
+              <a:rPr lang="en-US" sz="3200" b="1" dirty="0"/>
+              <a:t>Database Integration Progress</a:t>
+            </a:r>
+          </a:p>
+        </p:txBody>
+      </p:sp>
+      <p:sp>
+        <p:nvSpPr>
+          <p:cNvPr id="6" name="Content Placeholder 5">
+            <a:extLst>
+              <a:ext uri="{FF2B5EF4-FFF2-40B4-BE49-F238E27FC236}">
+                <a16:creationId xmlns:a16="http://schemas.microsoft.com/office/drawing/2014/main" id="{DA090DEF-BA2D-EFBE-C0C3-BA92EADBCFBA}"/>
+              </a:ext>
+            </a:extLst>
+          </p:cNvPr>
+          <p:cNvSpPr>
+            <a:spLocks noGrp="1"/>
+          </p:cNvSpPr>
+          <p:nvPr>
+            <p:ph idx="1"/>
+          </p:nvPr>
+        </p:nvSpPr>
+        <p:spPr>
+          <a:xfrm>
+            <a:off x="3817856" y="1349884"/>
+            <a:ext cx="7239785" cy="3880773"/>
+          </a:xfrm>
+        </p:spPr>
+        <p:txBody>
+          <a:bodyPr>
+            <a:normAutofit/>
+          </a:bodyPr>
+          <a:lstStyle/>
+          <a:p>
+            <a:r>
+              <a:rPr lang="en-US" dirty="0"/>
+              <a:t>PHP Files Created in this milestone: </a:t>
+            </a:r>
+          </a:p>
+          <a:p>
+            <a:pPr lvl="1">
+              <a:buFont typeface="Wingdings" panose="05000000000000000000" pitchFamily="2" charset="2"/>
+              <a:buChar char="v"/>
+            </a:pPr>
+            <a:r>
+              <a:rPr lang="en-US" sz="2000" b="1" dirty="0" err="1"/>
+              <a:t>database.php</a:t>
+            </a:r>
+            <a:endParaRPr lang="en-US" sz="2000" b="1" dirty="0"/>
+          </a:p>
+          <a:p>
+            <a:pPr lvl="2">
+              <a:buFont typeface="Wingdings" panose="05000000000000000000" pitchFamily="2" charset="2"/>
+              <a:buChar char="§"/>
+            </a:pPr>
+            <a:r>
+              <a:rPr lang="en-US" sz="1800" dirty="0"/>
+              <a:t>Contains database connectivity settings</a:t>
+            </a:r>
+          </a:p>
+          <a:p>
+            <a:pPr lvl="2">
+              <a:buFont typeface="Wingdings" panose="05000000000000000000" pitchFamily="2" charset="2"/>
+              <a:buChar char="§"/>
+            </a:pPr>
+            <a:r>
+              <a:rPr lang="en-US" sz="1800" dirty="0"/>
+              <a:t>Helps promote database security and prevents redundant code.</a:t>
+            </a:r>
+          </a:p>
+          <a:p>
+            <a:pPr lvl="1"/>
+            <a:r>
+              <a:rPr lang="en-US" sz="2000" b="1" dirty="0" err="1"/>
+              <a:t>fetch_pets.php</a:t>
+            </a:r>
+            <a:endParaRPr lang="en-US" sz="2000" b="1" dirty="0"/>
+          </a:p>
+          <a:p>
+            <a:pPr lvl="2"/>
+            <a:r>
+              <a:rPr lang="en-US" sz="1800" dirty="0"/>
+              <a:t>Creates MySQL query for Pets database, and outputs data as a JSON file.</a:t>
+            </a:r>
+          </a:p>
+          <a:p>
+            <a:pPr lvl="2"/>
+            <a:r>
+              <a:rPr lang="en-US" sz="1800" dirty="0"/>
+              <a:t>JavaScript file will read JSON file and allow popups to display information about each pet. </a:t>
+            </a:r>
+          </a:p>
+          <a:p>
+            <a:pPr lvl="2"/>
+            <a:endParaRPr lang="en-US" dirty="0"/>
+          </a:p>
+        </p:txBody>
+      </p:sp>
+      <p:sp>
+        <p:nvSpPr>
+          <p:cNvPr id="4" name="TextBox 3">
+            <a:extLst>
+              <a:ext uri="{FF2B5EF4-FFF2-40B4-BE49-F238E27FC236}">
+                <a16:creationId xmlns:a16="http://schemas.microsoft.com/office/drawing/2014/main" id="{0CEDFAA1-8C84-4894-BE7C-4F47649533E9}"/>
+              </a:ext>
+            </a:extLst>
+          </p:cNvPr>
+          <p:cNvSpPr txBox="1"/>
+          <p:nvPr/>
+        </p:nvSpPr>
+        <p:spPr>
+          <a:xfrm>
+            <a:off x="790456" y="1745734"/>
+            <a:ext cx="3027400" cy="1114857"/>
+          </a:xfrm>
+          <a:prstGeom prst="rect">
+            <a:avLst/>
+          </a:prstGeom>
+          <a:noFill/>
+        </p:spPr>
+        <p:txBody>
+          <a:bodyPr wrap="square">
+            <a:spAutoFit/>
+          </a:bodyPr>
+          <a:lstStyle/>
+          <a:p>
+            <a:pPr>
+              <a:lnSpc>
+                <a:spcPct val="200000"/>
+              </a:lnSpc>
+            </a:pPr>
+            <a:r>
+              <a:rPr lang="en-US" b="1" dirty="0"/>
+              <a:t>Languages/Frameworks:</a:t>
+            </a:r>
+          </a:p>
+          <a:p>
+            <a:pPr marL="285750" indent="-285750">
+              <a:lnSpc>
+                <a:spcPct val="200000"/>
+              </a:lnSpc>
+              <a:buFont typeface="Arial" panose="020B0604020202020204" pitchFamily="34" charset="0"/>
+              <a:buChar char="•"/>
+            </a:pPr>
+            <a:r>
+              <a:rPr lang="en-US" dirty="0"/>
+              <a:t> PHP</a:t>
+            </a:r>
+          </a:p>
+        </p:txBody>
+      </p:sp>
+    </p:spTree>
+    <p:extLst>
+      <p:ext uri="{BB962C8B-B14F-4D97-AF65-F5344CB8AC3E}">
+        <p14:creationId xmlns:p14="http://schemas.microsoft.com/office/powerpoint/2010/main" val="1475842300"/>
       </p:ext>
     </p:extLst>
   </p:cSld>
@@ -7921,7 +8676,7 @@
           <p:cNvPr id="2" name="Title 1">
             <a:extLst>
               <a:ext uri="{FF2B5EF4-FFF2-40B4-BE49-F238E27FC236}">
-                <a16:creationId xmlns:a16="http://schemas.microsoft.com/office/drawing/2014/main" id="{D29FC05C-DA36-4788-9A0A-5CA4A967476E}"/>
+                <a16:creationId xmlns:a16="http://schemas.microsoft.com/office/drawing/2014/main" id="{0343E49E-DE3A-1CE8-3F09-80A619D1ED4C}"/>
               </a:ext>
             </a:extLst>
           </p:cNvPr>
@@ -7934,12 +8689,14 @@
         </p:nvSpPr>
         <p:spPr/>
         <p:txBody>
-          <a:bodyPr/>
-          <a:lstStyle/>
-          <a:p>
-            <a:r>
-              <a:rPr lang="en-US"/>
-              <a:t>Next Steps and Milestones</a:t>
+          <a:bodyPr>
+            <a:normAutofit/>
+          </a:bodyPr>
+          <a:lstStyle/>
+          <a:p>
+            <a:r>
+              <a:rPr lang="en-US" sz="3200" b="1" dirty="0"/>
+              <a:t>Database Integration Troubleshooting</a:t>
             </a:r>
           </a:p>
         </p:txBody>
@@ -7949,7 +8706,7 @@
           <p:cNvPr id="3" name="Content Placeholder 2">
             <a:extLst>
               <a:ext uri="{FF2B5EF4-FFF2-40B4-BE49-F238E27FC236}">
-                <a16:creationId xmlns:a16="http://schemas.microsoft.com/office/drawing/2014/main" id="{E81F4E3A-FABB-488F-A612-325C171455D9}"/>
+                <a16:creationId xmlns:a16="http://schemas.microsoft.com/office/drawing/2014/main" id="{6381D10C-78D1-D00E-A988-BF91247A5C7D}"/>
               </a:ext>
             </a:extLst>
           </p:cNvPr>
@@ -7960,14 +8717,69 @@
             <p:ph idx="1"/>
           </p:nvPr>
         </p:nvSpPr>
-        <p:spPr/>
+        <p:spPr>
+          <a:xfrm>
+            <a:off x="677334" y="1488613"/>
+            <a:ext cx="8596668" cy="3880773"/>
+          </a:xfrm>
+        </p:spPr>
         <p:txBody>
           <a:bodyPr/>
           <a:lstStyle/>
           <a:p>
             <a:r>
-              <a:rPr lang="en-US"/>
-              <a:t>Going forward, we will continue to work on completing the front-end of the web application and use PHP to transmit data from the front-end to the database. Testing and Debugging will then be performed.</a:t>
+              <a:rPr lang="en-US" dirty="0"/>
+              <a:t>Ensuring the JSON file created by </a:t>
+            </a:r>
+            <a:r>
+              <a:rPr lang="en-US" dirty="0" err="1"/>
+              <a:t>fetch_pets</a:t>
+            </a:r>
+            <a:r>
+              <a:rPr lang="en-US" dirty="0"/>
+              <a:t> is formatted correctly</a:t>
+            </a:r>
+          </a:p>
+          <a:p>
+            <a:r>
+              <a:rPr lang="en-US" dirty="0"/>
+              <a:t>Ensuring </a:t>
+            </a:r>
+            <a:r>
+              <a:rPr lang="en-US" dirty="0" err="1"/>
+              <a:t>Javascript</a:t>
+            </a:r>
+            <a:r>
+              <a:rPr lang="en-US" dirty="0"/>
+              <a:t> file is able to read JSON file, and will generate pet information in each popup.</a:t>
+            </a:r>
+          </a:p>
+          <a:p>
+            <a:r>
+              <a:rPr lang="en-US" dirty="0"/>
+              <a:t>Converting </a:t>
+            </a:r>
+            <a:r>
+              <a:rPr lang="en-US" dirty="0" err="1"/>
+              <a:t>tinyInt</a:t>
+            </a:r>
+            <a:r>
+              <a:rPr lang="en-US" dirty="0"/>
+              <a:t> values from database, into ‘Yes’ and ‘No’ in </a:t>
+            </a:r>
+            <a:r>
+              <a:rPr lang="en-US" dirty="0" err="1"/>
+              <a:t>javascript</a:t>
+            </a:r>
+            <a:r>
+              <a:rPr lang="en-US" dirty="0"/>
+              <a:t> to make information more user friendly.</a:t>
+            </a:r>
+          </a:p>
+          <a:p>
+            <a:r>
+              <a:rPr lang="en-US" dirty="0"/>
+              <a:t>Although functional, the addition of the database integration in the Pet Search Page caused the format to change. Will work on correcting format in next Milestone.   </a:t>
             </a:r>
           </a:p>
         </p:txBody>
@@ -7975,7 +8787,7 @@
     </p:spTree>
     <p:extLst>
       <p:ext uri="{BB962C8B-B14F-4D97-AF65-F5344CB8AC3E}">
-        <p14:creationId xmlns:p14="http://schemas.microsoft.com/office/powerpoint/2010/main" val="2942119607"/>
+        <p14:creationId xmlns:p14="http://schemas.microsoft.com/office/powerpoint/2010/main" val="3233425778"/>
       </p:ext>
     </p:extLst>
   </p:cSld>
@@ -7988,14 +8800,6 @@
 <file path=ppt/slides/slide9.xml><?xml version="1.0" encoding="utf-8"?>
 <p:sld xmlns:a="http://schemas.openxmlformats.org/drawingml/2006/main" xmlns:r="http://schemas.openxmlformats.org/officeDocument/2006/relationships" xmlns:p="http://schemas.openxmlformats.org/presentationml/2006/main">
   <p:cSld>
-    <p:bg>
-      <p:bgPr>
-        <a:solidFill>
-          <a:schemeClr val="bg2"/>
-        </a:solidFill>
-        <a:effectLst/>
-      </p:bgPr>
-    </p:bg>
     <p:spTree>
       <p:nvGrpSpPr>
         <p:cNvPr id="1" name=""/>
@@ -8015,7 +8819,7 @@
           <p:cNvPr id="2" name="Title 1">
             <a:extLst>
               <a:ext uri="{FF2B5EF4-FFF2-40B4-BE49-F238E27FC236}">
-                <a16:creationId xmlns:a16="http://schemas.microsoft.com/office/drawing/2014/main" id="{FE3390AE-64F8-48D4-B054-58E9F20A117C}"/>
+                <a16:creationId xmlns:a16="http://schemas.microsoft.com/office/drawing/2014/main" id="{A0447C12-321A-0C26-BD6A-C939E09CCDDF}"/>
               </a:ext>
             </a:extLst>
           </p:cNvPr>
@@ -8028,88 +8832,33 @@
         </p:nvSpPr>
         <p:spPr>
           <a:xfrm>
-            <a:off x="4419136" y="1020871"/>
-            <a:ext cx="6960759" cy="2849671"/>
+            <a:off x="677334" y="609600"/>
+            <a:ext cx="7655962" cy="5819480"/>
           </a:xfrm>
         </p:spPr>
         <p:txBody>
-          <a:bodyPr vert="horz" lIns="91440" tIns="45720" rIns="91440" bIns="45720" rtlCol="0" anchor="b">
+          <a:bodyPr anchor="ctr" anchorCtr="0">
             <a:normAutofit/>
           </a:bodyPr>
           <a:lstStyle/>
           <a:p>
-            <a:r>
-              <a:rPr lang="en-US" sz="6000">
-                <a:solidFill>
-                  <a:srgbClr val="FFFFFF"/>
-                </a:solidFill>
-              </a:rPr>
-              <a:t>Q&amp;A </a:t>
-            </a:r>
-          </a:p>
-        </p:txBody>
-      </p:sp>
-      <p:sp>
-        <p:nvSpPr>
-          <p:cNvPr id="3" name="Content Placeholder 2">
-            <a:extLst>
-              <a:ext uri="{FF2B5EF4-FFF2-40B4-BE49-F238E27FC236}">
-                <a16:creationId xmlns:a16="http://schemas.microsoft.com/office/drawing/2014/main" id="{3081C2D6-6485-4513-89B9-1A63DC04F193}"/>
-              </a:ext>
-            </a:extLst>
-          </p:cNvPr>
-          <p:cNvSpPr>
-            <a:spLocks noGrp="1"/>
-          </p:cNvSpPr>
-          <p:nvPr>
-            <p:ph idx="1"/>
-          </p:nvPr>
-        </p:nvSpPr>
-        <p:spPr>
-          <a:xfrm>
-            <a:off x="4456386" y="3962088"/>
-            <a:ext cx="6203795" cy="1186108"/>
-          </a:xfrm>
-        </p:spPr>
-        <p:txBody>
-          <a:bodyPr vert="horz" lIns="91440" tIns="45720" rIns="91440" bIns="45720" rtlCol="0" anchor="t">
-            <a:normAutofit/>
-          </a:bodyPr>
-          <a:lstStyle/>
-          <a:p>
-            <a:pPr marL="0" indent="0">
-              <a:buNone/>
-            </a:pPr>
-            <a:r>
-              <a:rPr lang="en-US">
-                <a:solidFill>
-                  <a:srgbClr val="FFFFFF">
-                    <a:alpha val="70000"/>
-                  </a:srgbClr>
-                </a:solidFill>
-                <a:effectLst/>
-              </a:rPr>
-              <a:t>We’d love to answer any questions you have about the Paradise Pet project and our journey so far.</a:t>
-            </a:r>
-            <a:endParaRPr lang="en-US">
-              <a:solidFill>
-                <a:srgbClr val="FFFFFF">
-                  <a:alpha val="70000"/>
-                </a:srgbClr>
-              </a:solidFill>
-            </a:endParaRPr>
+            <a:pPr algn="ctr"/>
+            <a:r>
+              <a:rPr lang="en-US" sz="5000" b="1" dirty="0"/>
+              <a:t>For Last Milestone</a:t>
+            </a:r>
           </a:p>
         </p:txBody>
       </p:sp>
     </p:spTree>
     <p:extLst>
       <p:ext uri="{BB962C8B-B14F-4D97-AF65-F5344CB8AC3E}">
-        <p14:creationId xmlns:p14="http://schemas.microsoft.com/office/powerpoint/2010/main" val="644934295"/>
+        <p14:creationId xmlns:p14="http://schemas.microsoft.com/office/powerpoint/2010/main" val="204964998"/>
       </p:ext>
     </p:extLst>
   </p:cSld>
   <p:clrMapOvr>
-    <a:overrideClrMapping bg1="dk1" tx1="lt1" bg2="dk2" tx2="lt2" accent1="accent1" accent2="accent2" accent3="accent3" accent4="accent4" accent5="accent5" accent6="accent6" hlink="hlink" folHlink="folHlink"/>
+    <a:masterClrMapping/>
   </p:clrMapOvr>
 </p:sld>
 </file>

</xml_diff>